<commit_message>
modifs poster (part 1 and 3) part 4, 6 and 7 left
</commit_message>
<xml_diff>
--- a/PosterPAFIncertitude.pptx
+++ b/PosterPAFIncertitude.pptx
@@ -1059,27 +1059,27 @@
         <a:lstStyle/>
         <a:p>
           <a:r>
-            <a:rPr lang="fr-FR" sz="4000" dirty="0" err="1" smtClean="0">
+            <a:rPr lang="fr-FR" sz="4000" i="0" dirty="0" smtClean="0">
               <a:latin typeface="Segoe UI Light" pitchFamily="34" charset="0"/>
               <a:cs typeface="Segoe UI Light" pitchFamily="34" charset="0"/>
             </a:rPr>
-            <a:t>Quality</a:t>
+            <a:t>Qualité de l’  «</a:t>
           </a:r>
           <a:r>
-            <a:rPr lang="fr-FR" sz="4000" dirty="0" smtClean="0">
+            <a:rPr lang="fr-FR" sz="4000" i="0" dirty="0" err="1" smtClean="0">
               <a:latin typeface="Segoe UI Light" pitchFamily="34" charset="0"/>
               <a:cs typeface="Segoe UI Light" pitchFamily="34" charset="0"/>
             </a:rPr>
-            <a:t> of </a:t>
+            <a:t>aléatoirité</a:t>
           </a:r>
           <a:r>
-            <a:rPr lang="fr-FR" sz="4000" i="1" dirty="0" err="1" smtClean="0">
+            <a:rPr lang="fr-FR" sz="4000" i="0" dirty="0" smtClean="0">
               <a:latin typeface="Segoe UI Light" pitchFamily="34" charset="0"/>
               <a:cs typeface="Segoe UI Light" pitchFamily="34" charset="0"/>
             </a:rPr>
-            <a:t>randomness</a:t>
+            <a:t> » </a:t>
           </a:r>
-          <a:endParaRPr lang="fr-FR" sz="4000" i="1" dirty="0">
+          <a:endParaRPr lang="fr-FR" sz="4000" i="0" dirty="0">
             <a:latin typeface="Segoe UI Light" pitchFamily="34" charset="0"/>
             <a:cs typeface="Segoe UI Light" pitchFamily="34" charset="0"/>
           </a:endParaRPr>
@@ -1795,27 +1795,27 @@
             </a:spcAft>
           </a:pPr>
           <a:r>
-            <a:rPr lang="fr-FR" sz="4000" kern="1200" dirty="0" err="1" smtClean="0">
+            <a:rPr lang="fr-FR" sz="4000" i="0" kern="1200" dirty="0" smtClean="0">
               <a:latin typeface="Segoe UI Light" pitchFamily="34" charset="0"/>
               <a:cs typeface="Segoe UI Light" pitchFamily="34" charset="0"/>
             </a:rPr>
-            <a:t>Quality</a:t>
+            <a:t>Qualité de l’  «</a:t>
           </a:r>
           <a:r>
-            <a:rPr lang="fr-FR" sz="4000" kern="1200" dirty="0" smtClean="0">
+            <a:rPr lang="fr-FR" sz="4000" i="0" kern="1200" dirty="0" err="1" smtClean="0">
               <a:latin typeface="Segoe UI Light" pitchFamily="34" charset="0"/>
               <a:cs typeface="Segoe UI Light" pitchFamily="34" charset="0"/>
             </a:rPr>
-            <a:t> of </a:t>
+            <a:t>aléatoirité</a:t>
           </a:r>
           <a:r>
-            <a:rPr lang="fr-FR" sz="4000" i="1" kern="1200" dirty="0" err="1" smtClean="0">
+            <a:rPr lang="fr-FR" sz="4000" i="0" kern="1200" dirty="0" smtClean="0">
               <a:latin typeface="Segoe UI Light" pitchFamily="34" charset="0"/>
               <a:cs typeface="Segoe UI Light" pitchFamily="34" charset="0"/>
             </a:rPr>
-            <a:t>randomness</a:t>
+            <a:t> » </a:t>
           </a:r>
-          <a:endParaRPr lang="fr-FR" sz="4000" i="1" kern="1200" dirty="0">
+          <a:endParaRPr lang="fr-FR" sz="4000" i="0" kern="1200" dirty="0">
             <a:latin typeface="Segoe UI Light" pitchFamily="34" charset="0"/>
             <a:cs typeface="Segoe UI Light" pitchFamily="34" charset="0"/>
           </a:endParaRPr>
@@ -7084,8 +7084,8 @@
         </p:nvSpPr>
         <p:spPr>
           <a:xfrm>
-            <a:off x="585716" y="4680745"/>
-            <a:ext cx="9567562" cy="2246769"/>
+            <a:off x="585716" y="4536729"/>
+            <a:ext cx="9567562" cy="4216539"/>
           </a:xfrm>
           <a:prstGeom prst="rect">
             <a:avLst/>
@@ -7219,7 +7219,193 @@
               <a:buChar char="§"/>
               <a:defRPr/>
             </a:pPr>
-            <a:endParaRPr lang="fr-CA" sz="4300" dirty="0" smtClean="0">
+            <a:endParaRPr lang="fr-CA" sz="4300" dirty="0">
+              <a:solidFill>
+                <a:prstClr val="black"/>
+              </a:solidFill>
+              <a:latin typeface="Segoe UI Light" pitchFamily="34" charset="0"/>
+              <a:cs typeface="Segoe UI Light" pitchFamily="34" charset="0"/>
+            </a:endParaRPr>
+          </a:p>
+          <a:p>
+            <a:pPr lvl="0" algn="ctr">
+              <a:defRPr/>
+            </a:pPr>
+            <a:r>
+              <a:rPr lang="fr-CA" sz="4800" dirty="0" smtClean="0">
+                <a:solidFill>
+                  <a:prstClr val="black"/>
+                </a:solidFill>
+                <a:latin typeface="Segoe UI Light" pitchFamily="34" charset="0"/>
+                <a:cs typeface="Segoe UI Light" pitchFamily="34" charset="0"/>
+              </a:rPr>
+              <a:t>0</a:t>
+            </a:r>
+            <a:r>
+              <a:rPr lang="fr-CA" sz="4800" dirty="0" smtClean="0">
+                <a:solidFill>
+                  <a:srgbClr val="0000FF"/>
+                </a:solidFill>
+                <a:latin typeface="Segoe UI Light" pitchFamily="34" charset="0"/>
+                <a:cs typeface="Segoe UI Light" pitchFamily="34" charset="0"/>
+              </a:rPr>
+              <a:t>1111</a:t>
+            </a:r>
+            <a:r>
+              <a:rPr lang="fr-CA" sz="4800" dirty="0" smtClean="0">
+                <a:solidFill>
+                  <a:prstClr val="black"/>
+                </a:solidFill>
+                <a:latin typeface="Segoe UI Light" pitchFamily="34" charset="0"/>
+                <a:cs typeface="Segoe UI Light" pitchFamily="34" charset="0"/>
+              </a:rPr>
+              <a:t>0000</a:t>
+            </a:r>
+            <a:r>
+              <a:rPr lang="fr-CA" sz="4800" dirty="0" smtClean="0">
+                <a:solidFill>
+                  <a:srgbClr val="0000FF"/>
+                </a:solidFill>
+                <a:latin typeface="Segoe UI Light" pitchFamily="34" charset="0"/>
+                <a:cs typeface="Segoe UI Light" pitchFamily="34" charset="0"/>
+              </a:rPr>
+              <a:t>111</a:t>
+            </a:r>
+            <a:r>
+              <a:rPr lang="fr-CA" sz="4800" dirty="0" smtClean="0">
+                <a:solidFill>
+                  <a:prstClr val="black"/>
+                </a:solidFill>
+                <a:latin typeface="Segoe UI Light" pitchFamily="34" charset="0"/>
+                <a:cs typeface="Segoe UI Light" pitchFamily="34" charset="0"/>
+              </a:rPr>
+              <a:t>0</a:t>
+            </a:r>
+            <a:r>
+              <a:rPr lang="fr-CA" sz="4800" dirty="0" smtClean="0">
+                <a:solidFill>
+                  <a:srgbClr val="0000FF"/>
+                </a:solidFill>
+                <a:latin typeface="Segoe UI Light" pitchFamily="34" charset="0"/>
+                <a:cs typeface="Segoe UI Light" pitchFamily="34" charset="0"/>
+              </a:rPr>
+              <a:t>111</a:t>
+            </a:r>
+            <a:r>
+              <a:rPr lang="fr-CA" sz="4800" dirty="0" smtClean="0">
+                <a:solidFill>
+                  <a:prstClr val="black"/>
+                </a:solidFill>
+                <a:latin typeface="Segoe UI Light" pitchFamily="34" charset="0"/>
+                <a:cs typeface="Segoe UI Light" pitchFamily="34" charset="0"/>
+              </a:rPr>
+              <a:t>0</a:t>
+            </a:r>
+            <a:r>
+              <a:rPr lang="fr-CA" sz="4800" dirty="0" smtClean="0">
+                <a:solidFill>
+                  <a:srgbClr val="0000FF"/>
+                </a:solidFill>
+                <a:latin typeface="Segoe UI Light" pitchFamily="34" charset="0"/>
+                <a:cs typeface="Segoe UI Light" pitchFamily="34" charset="0"/>
+              </a:rPr>
+              <a:t>11</a:t>
+            </a:r>
+            <a:r>
+              <a:rPr lang="fr-CA" sz="4800" dirty="0" smtClean="0">
+                <a:solidFill>
+                  <a:prstClr val="black"/>
+                </a:solidFill>
+                <a:latin typeface="Segoe UI Light" pitchFamily="34" charset="0"/>
+                <a:cs typeface="Segoe UI Light" pitchFamily="34" charset="0"/>
+              </a:rPr>
+              <a:t>0</a:t>
+            </a:r>
+            <a:r>
+              <a:rPr lang="fr-CA" sz="4800" dirty="0" smtClean="0">
+                <a:solidFill>
+                  <a:srgbClr val="0000FF"/>
+                </a:solidFill>
+                <a:latin typeface="Segoe UI Light" pitchFamily="34" charset="0"/>
+                <a:cs typeface="Segoe UI Light" pitchFamily="34" charset="0"/>
+              </a:rPr>
+              <a:t>1</a:t>
+            </a:r>
+            <a:r>
+              <a:rPr lang="fr-CA" sz="4800" dirty="0" smtClean="0">
+                <a:solidFill>
+                  <a:prstClr val="black"/>
+                </a:solidFill>
+                <a:latin typeface="Segoe UI Light" pitchFamily="34" charset="0"/>
+                <a:cs typeface="Segoe UI Light" pitchFamily="34" charset="0"/>
+              </a:rPr>
+              <a:t>0</a:t>
+            </a:r>
+            <a:r>
+              <a:rPr lang="fr-CA" sz="4800" dirty="0" smtClean="0">
+                <a:solidFill>
+                  <a:srgbClr val="0000FF"/>
+                </a:solidFill>
+                <a:latin typeface="Segoe UI Light" pitchFamily="34" charset="0"/>
+                <a:cs typeface="Segoe UI Light" pitchFamily="34" charset="0"/>
+              </a:rPr>
+              <a:t>1</a:t>
+            </a:r>
+            <a:r>
+              <a:rPr lang="is-IS" sz="4800" smtClean="0">
+                <a:solidFill>
+                  <a:srgbClr val="0000FF"/>
+                </a:solidFill>
+                <a:latin typeface="Segoe UI Light" pitchFamily="34" charset="0"/>
+                <a:cs typeface="Segoe UI Light" pitchFamily="34" charset="0"/>
+              </a:rPr>
+              <a:t>…1</a:t>
+            </a:r>
+            <a:r>
+              <a:rPr lang="is-IS" sz="4800" smtClean="0">
+                <a:latin typeface="Segoe UI Light" pitchFamily="34" charset="0"/>
+                <a:cs typeface="Segoe UI Light" pitchFamily="34" charset="0"/>
+              </a:rPr>
+              <a:t>00</a:t>
+            </a:r>
+            <a:endParaRPr lang="fr-CA" sz="4800" dirty="0">
+              <a:solidFill>
+                <a:srgbClr val="0000FF"/>
+              </a:solidFill>
+              <a:latin typeface="Segoe UI Light" pitchFamily="34" charset="0"/>
+              <a:cs typeface="Segoe UI Light" pitchFamily="34" charset="0"/>
+            </a:endParaRPr>
+          </a:p>
+          <a:p>
+            <a:pPr lvl="0" algn="just">
+              <a:defRPr/>
+            </a:pPr>
+            <a:r>
+              <a:rPr lang="fr-CA" sz="4000" dirty="0">
+                <a:solidFill>
+                  <a:prstClr val="black"/>
+                </a:solidFill>
+                <a:latin typeface="Segoe UI Light" pitchFamily="34" charset="0"/>
+                <a:cs typeface="Segoe UI Light" pitchFamily="34" charset="0"/>
+              </a:rPr>
+              <a:t>Est-ce vraiment une séquence aléatoire</a:t>
+            </a:r>
+            <a:r>
+              <a:rPr lang="fr-CA" sz="4000" dirty="0" smtClean="0">
+                <a:solidFill>
+                  <a:prstClr val="black"/>
+                </a:solidFill>
+                <a:latin typeface="Segoe UI Light" pitchFamily="34" charset="0"/>
+                <a:cs typeface="Segoe UI Light" pitchFamily="34" charset="0"/>
+              </a:rPr>
+              <a:t>?</a:t>
+            </a:r>
+          </a:p>
+          <a:p>
+            <a:pPr lvl="0" algn="just">
+              <a:defRPr/>
+            </a:pPr>
+            <a:endParaRPr lang="fr-CA" sz="4000" dirty="0" smtClean="0">
               <a:solidFill>
                 <a:prstClr val="black"/>
               </a:solidFill>
@@ -8479,7 +8665,7 @@
         </p:nvSpPr>
         <p:spPr>
           <a:xfrm>
-            <a:off x="10441310" y="4680745"/>
+            <a:off x="10441310" y="4536729"/>
             <a:ext cx="10657334" cy="4431983"/>
           </a:xfrm>
           <a:prstGeom prst="rect">
@@ -8998,7 +9184,7 @@
           <p:nvPr>
             <p:extLst>
               <p:ext uri="{D42A27DB-BD31-4B8C-83A1-F6EECF244321}">
-                <p14:modId xmlns:p14="http://schemas.microsoft.com/office/powerpoint/2010/main" val="3433467399"/>
+                <p14:modId xmlns:p14="http://schemas.microsoft.com/office/powerpoint/2010/main" val="731697408"/>
               </p:ext>
             </p:extLst>
           </p:nvPr>

</xml_diff>